<commit_message>
added first working version of dql expert
</commit_message>
<xml_diff>
--- a/docs/Deep_Inverse_Q_Learning-chinthaka.pptx
+++ b/docs/Deep_Inverse_Q_Learning-chinthaka.pptx
@@ -5,7 +5,7 @@
     <p:sldMasterId id="2147484033" r:id="rId1"/>
   </p:sldMasterIdLst>
   <p:notesMasterIdLst>
-    <p:notesMasterId r:id="rId19"/>
+    <p:notesMasterId r:id="rId21"/>
   </p:notesMasterIdLst>
   <p:sldIdLst>
     <p:sldId id="256" r:id="rId2"/>
@@ -25,6 +25,8 @@
     <p:sldId id="284" r:id="rId16"/>
     <p:sldId id="285" r:id="rId17"/>
     <p:sldId id="286" r:id="rId18"/>
+    <p:sldId id="291" r:id="rId19"/>
+    <p:sldId id="290" r:id="rId20"/>
   </p:sldIdLst>
   <p:sldSz cx="12192000" cy="6858000"/>
   <p:notesSz cx="6858000" cy="9144000"/>
@@ -213,7 +215,7 @@
           <a:p>
             <a:fld id="{C1228EDD-F92F-8142-B83E-C19EC04F34C9}" type="datetimeFigureOut">
               <a:rPr lang="en-US" smtClean="0"/>
-              <a:t>4/3/23</a:t>
+              <a:t>4/13/23</a:t>
             </a:fld>
             <a:endParaRPr lang="en-US"/>
           </a:p>
@@ -747,7 +749,7 @@
           <a:p>
             <a:fld id="{D8EDCB6C-42F2-304B-AE50-5727A6C827AD}" type="datetime1">
               <a:rPr lang="en-US" smtClean="0"/>
-              <a:t>4/3/23</a:t>
+              <a:t>4/13/23</a:t>
             </a:fld>
             <a:endParaRPr lang="en-US"/>
           </a:p>
@@ -1022,7 +1024,7 @@
           <a:p>
             <a:fld id="{8C2E2C2F-B67C-274F-8B32-7D2E6E2D91AE}" type="datetime1">
               <a:rPr lang="en-US" smtClean="0"/>
-              <a:t>4/3/23</a:t>
+              <a:t>4/13/23</a:t>
             </a:fld>
             <a:endParaRPr lang="en-US"/>
           </a:p>
@@ -1216,7 +1218,7 @@
           <a:p>
             <a:fld id="{13B825F4-2D21-034C-8123-A55B7B695247}" type="datetime1">
               <a:rPr lang="en-US" smtClean="0"/>
-              <a:t>4/3/23</a:t>
+              <a:t>4/13/23</a:t>
             </a:fld>
             <a:endParaRPr lang="en-US"/>
           </a:p>
@@ -1484,7 +1486,7 @@
           <a:p>
             <a:fld id="{8B9298D0-1221-9E47-B32A-9EFAD3B30C37}" type="datetime1">
               <a:rPr lang="en-US" smtClean="0"/>
-              <a:t>4/3/23</a:t>
+              <a:t>4/13/23</a:t>
             </a:fld>
             <a:endParaRPr lang="en-US"/>
           </a:p>
@@ -1816,7 +1818,7 @@
           <a:p>
             <a:fld id="{2BFE9E1B-3A75-D343-997B-61E2AA256BED}" type="datetime1">
               <a:rPr lang="en-US" smtClean="0"/>
-              <a:t>4/3/23</a:t>
+              <a:t>4/13/23</a:t>
             </a:fld>
             <a:endParaRPr lang="en-US"/>
           </a:p>
@@ -2426,7 +2428,7 @@
           <a:p>
             <a:fld id="{0726AA34-FA58-F145-ABC5-5D36038D5EEA}" type="datetime1">
               <a:rPr lang="en-US" smtClean="0"/>
-              <a:t>4/3/23</a:t>
+              <a:t>4/13/23</a:t>
             </a:fld>
             <a:endParaRPr lang="en-US"/>
           </a:p>
@@ -3273,7 +3275,7 @@
           <a:p>
             <a:fld id="{FDB1009E-2FB6-B948-B944-24C5576F825C}" type="datetime1">
               <a:rPr lang="en-US" smtClean="0"/>
-              <a:t>4/3/23</a:t>
+              <a:t>4/13/23</a:t>
             </a:fld>
             <a:endParaRPr lang="en-US"/>
           </a:p>
@@ -3443,7 +3445,7 @@
           <a:p>
             <a:fld id="{6C8144DB-19F6-074A-BA62-58378F42C4BE}" type="datetime1">
               <a:rPr lang="en-US" smtClean="0"/>
-              <a:t>4/3/23</a:t>
+              <a:t>4/13/23</a:t>
             </a:fld>
             <a:endParaRPr lang="en-US"/>
           </a:p>
@@ -3623,7 +3625,7 @@
           <a:p>
             <a:fld id="{2817B9ED-7423-594E-BE6E-A3DE24DE5122}" type="datetime1">
               <a:rPr lang="en-US" smtClean="0"/>
-              <a:t>4/3/23</a:t>
+              <a:t>4/13/23</a:t>
             </a:fld>
             <a:endParaRPr lang="en-US"/>
           </a:p>
@@ -3793,7 +3795,7 @@
           <a:p>
             <a:fld id="{9F650C93-B8FE-9743-8172-C05957EFB87C}" type="datetime1">
               <a:rPr lang="en-US" smtClean="0"/>
-              <a:t>4/3/23</a:t>
+              <a:t>4/13/23</a:t>
             </a:fld>
             <a:endParaRPr lang="en-US"/>
           </a:p>
@@ -4037,7 +4039,7 @@
           <a:p>
             <a:fld id="{0E931497-0394-FA44-BB05-EDB8BA47A151}" type="datetime1">
               <a:rPr lang="en-US" smtClean="0"/>
-              <a:t>4/3/23</a:t>
+              <a:t>4/13/23</a:t>
             </a:fld>
             <a:endParaRPr lang="en-US"/>
           </a:p>
@@ -4329,7 +4331,7 @@
           <a:p>
             <a:fld id="{592D6688-5440-804E-8E05-3B82E0C1D445}" type="datetime1">
               <a:rPr lang="en-US" smtClean="0"/>
-              <a:t>4/3/23</a:t>
+              <a:t>4/13/23</a:t>
             </a:fld>
             <a:endParaRPr lang="en-US"/>
           </a:p>
@@ -4772,7 +4774,7 @@
           <a:p>
             <a:fld id="{4F653B71-11E0-0446-8ADB-D698B48BEA5A}" type="datetime1">
               <a:rPr lang="en-US" smtClean="0"/>
-              <a:t>4/3/23</a:t>
+              <a:t>4/13/23</a:t>
             </a:fld>
             <a:endParaRPr lang="en-US"/>
           </a:p>
@@ -4895,7 +4897,7 @@
           <a:p>
             <a:fld id="{4842C25E-86BB-2642-864C-49E0B3276656}" type="datetime1">
               <a:rPr lang="en-US" smtClean="0"/>
-              <a:t>4/3/23</a:t>
+              <a:t>4/13/23</a:t>
             </a:fld>
             <a:endParaRPr lang="en-US"/>
           </a:p>
@@ -4990,7 +4992,7 @@
           <a:p>
             <a:fld id="{7C032C44-8D91-B54E-A4CC-25F0E7FE789D}" type="datetime1">
               <a:rPr lang="en-US" smtClean="0"/>
-              <a:t>4/3/23</a:t>
+              <a:t>4/13/23</a:t>
             </a:fld>
             <a:endParaRPr lang="en-US"/>
           </a:p>
@@ -5269,7 +5271,7 @@
           <a:p>
             <a:fld id="{83E86633-25D9-D54C-B119-518F4D9AD4F8}" type="datetime1">
               <a:rPr lang="en-US" smtClean="0"/>
-              <a:t>4/3/23</a:t>
+              <a:t>4/13/23</a:t>
             </a:fld>
             <a:endParaRPr lang="en-US"/>
           </a:p>
@@ -5549,7 +5551,7 @@
           <a:p>
             <a:fld id="{8B597637-AAC0-424F-8CCB-602F6CD5299E}" type="datetime1">
               <a:rPr lang="en-US" smtClean="0"/>
-              <a:t>4/3/23</a:t>
+              <a:t>4/13/23</a:t>
             </a:fld>
             <a:endParaRPr lang="en-US"/>
           </a:p>
@@ -5978,7 +5980,7 @@
           <a:p>
             <a:fld id="{9CB948AF-CD3C-0D44-AC51-010FFFE28289}" type="datetime1">
               <a:rPr lang="en-US" smtClean="0"/>
-              <a:t>4/3/23</a:t>
+              <a:t>4/13/23</a:t>
             </a:fld>
             <a:endParaRPr lang="en-US"/>
           </a:p>
@@ -11213,8 +11215,8 @@
         </p:nvSpPr>
         <p:spPr>
           <a:xfrm>
-            <a:off x="4124927" y="3102489"/>
-            <a:ext cx="3942145" cy="1071159"/>
+            <a:off x="1959228" y="2799559"/>
+            <a:ext cx="8273544" cy="1497560"/>
           </a:xfrm>
         </p:spPr>
         <p:txBody>
@@ -11223,9 +11225,21 @@
           </a:bodyPr>
           <a:lstStyle/>
           <a:p>
+            <a:pPr algn="ctr"/>
+            <a:r>
+              <a:rPr lang="en-US" sz="3600" dirty="0">
+                <a:solidFill>
+                  <a:schemeClr val="tx1"/>
+                </a:solidFill>
+              </a:rPr>
+              <a:t>Project 2: </a:t>
+            </a:r>
+          </a:p>
+          <a:p>
+            <a:pPr algn="ctr"/>
             <a:r>
               <a:rPr lang="en-US" sz="4400" dirty="0"/>
-              <a:t>Thank you..!</a:t>
+              <a:t>Deep inverse q-learning</a:t>
             </a:r>
           </a:p>
         </p:txBody>
@@ -11271,6 +11285,520 @@
     <p:extLst>
       <p:ext uri="{BB962C8B-B14F-4D97-AF65-F5344CB8AC3E}">
         <p14:creationId xmlns:p14="http://schemas.microsoft.com/office/powerpoint/2010/main" val="2751108085"/>
+      </p:ext>
+    </p:extLst>
+  </p:cSld>
+  <p:clrMapOvr>
+    <a:masterClrMapping/>
+  </p:clrMapOvr>
+</p:sld>
+</file>
+
+<file path=ppt/slides/slide18.xml><?xml version="1.0" encoding="utf-8"?>
+<p:sld xmlns:a="http://schemas.openxmlformats.org/drawingml/2006/main" xmlns:r="http://schemas.openxmlformats.org/officeDocument/2006/relationships" xmlns:p="http://schemas.openxmlformats.org/presentationml/2006/main">
+  <p:cSld>
+    <p:spTree>
+      <p:nvGrpSpPr>
+        <p:cNvPr id="1" name=""/>
+        <p:cNvGrpSpPr/>
+        <p:nvPr/>
+      </p:nvGrpSpPr>
+      <p:grpSpPr>
+        <a:xfrm>
+          <a:off x="0" y="0"/>
+          <a:ext cx="0" cy="0"/>
+          <a:chOff x="0" y="0"/>
+          <a:chExt cx="0" cy="0"/>
+        </a:xfrm>
+      </p:grpSpPr>
+      <p:sp>
+        <p:nvSpPr>
+          <p:cNvPr id="3" name="Subtitle 2">
+            <a:extLst>
+              <a:ext uri="{FF2B5EF4-FFF2-40B4-BE49-F238E27FC236}">
+                <a16:creationId xmlns:a16="http://schemas.microsoft.com/office/drawing/2014/main" id="{038BE419-BB5F-A1E1-552E-536A04575F45}"/>
+              </a:ext>
+            </a:extLst>
+          </p:cNvPr>
+          <p:cNvSpPr>
+            <a:spLocks noGrp="1"/>
+          </p:cNvSpPr>
+          <p:nvPr>
+            <p:ph type="subTitle" idx="1"/>
+          </p:nvPr>
+        </p:nvSpPr>
+        <p:spPr>
+          <a:xfrm>
+            <a:off x="450850" y="566738"/>
+            <a:ext cx="11087100" cy="493712"/>
+          </a:xfrm>
+        </p:spPr>
+        <p:txBody>
+          <a:bodyPr>
+            <a:normAutofit lnSpcReduction="10000"/>
+          </a:bodyPr>
+          <a:lstStyle/>
+          <a:p>
+            <a:pPr algn="l"/>
+            <a:r>
+              <a:rPr lang="en-US" sz="2800" dirty="0"/>
+              <a:t>1. Introduction</a:t>
+            </a:r>
+          </a:p>
+          <a:p>
+            <a:pPr algn="l"/>
+            <a:endParaRPr lang="en-US" sz="2800" dirty="0"/>
+          </a:p>
+        </p:txBody>
+      </p:sp>
+      <p:pic>
+        <p:nvPicPr>
+          <p:cNvPr id="4" name="Picture 3">
+            <a:extLst>
+              <a:ext uri="{FF2B5EF4-FFF2-40B4-BE49-F238E27FC236}">
+                <a16:creationId xmlns:a16="http://schemas.microsoft.com/office/drawing/2014/main" id="{BAEC3426-3BCE-9547-9B01-D3FF729B61CB}"/>
+              </a:ext>
+            </a:extLst>
+          </p:cNvPr>
+          <p:cNvPicPr>
+            <a:picLocks noChangeAspect="1"/>
+          </p:cNvPicPr>
+          <p:nvPr/>
+        </p:nvPicPr>
+        <p:blipFill>
+          <a:blip r:embed="rId2">
+            <a:extLst>
+              <a:ext uri="{28A0092B-C50C-407E-A947-70E740481C1C}">
+                <a14:useLocalDpi xmlns:a14="http://schemas.microsoft.com/office/drawing/2010/main" val="0"/>
+              </a:ext>
+            </a:extLst>
+          </a:blip>
+          <a:stretch>
+            <a:fillRect/>
+          </a:stretch>
+        </p:blipFill>
+        <p:spPr>
+          <a:xfrm>
+            <a:off x="3238471" y="2498805"/>
+            <a:ext cx="5715057" cy="4074170"/>
+          </a:xfrm>
+          <a:prstGeom prst="rect">
+            <a:avLst/>
+          </a:prstGeom>
+        </p:spPr>
+      </p:pic>
+      <p:sp>
+        <p:nvSpPr>
+          <p:cNvPr id="7" name="Subtitle 2">
+            <a:extLst>
+              <a:ext uri="{FF2B5EF4-FFF2-40B4-BE49-F238E27FC236}">
+                <a16:creationId xmlns:a16="http://schemas.microsoft.com/office/drawing/2014/main" id="{212030BE-F3E4-2A43-B876-3F3E4FA803EB}"/>
+              </a:ext>
+            </a:extLst>
+          </p:cNvPr>
+          <p:cNvSpPr txBox="1">
+            <a:spLocks/>
+          </p:cNvSpPr>
+          <p:nvPr/>
+        </p:nvSpPr>
+        <p:spPr>
+          <a:xfrm>
+            <a:off x="854500" y="1133551"/>
+            <a:ext cx="10077450" cy="371789"/>
+          </a:xfrm>
+          <a:prstGeom prst="rect">
+            <a:avLst/>
+          </a:prstGeom>
+        </p:spPr>
+        <p:txBody>
+          <a:bodyPr vert="horz" lIns="91440" tIns="45720" rIns="91440" bIns="45720" rtlCol="0">
+            <a:normAutofit/>
+          </a:bodyPr>
+          <a:lstStyle>
+            <a:lvl1pPr marL="0" indent="0" algn="ctr" defTabSz="914400" rtl="0" eaLnBrk="1" latinLnBrk="0" hangingPunct="1">
+              <a:lnSpc>
+                <a:spcPct val="90000"/>
+              </a:lnSpc>
+              <a:spcBef>
+                <a:spcPts val="1000"/>
+              </a:spcBef>
+              <a:buFont typeface="Arial" panose="020B0604020202020204" pitchFamily="34" charset="0"/>
+              <a:buNone/>
+              <a:defRPr sz="2400" kern="1200">
+                <a:solidFill>
+                  <a:schemeClr val="tx1"/>
+                </a:solidFill>
+                <a:latin typeface="+mn-lt"/>
+                <a:ea typeface="+mn-ea"/>
+                <a:cs typeface="+mn-cs"/>
+              </a:defRPr>
+            </a:lvl1pPr>
+            <a:lvl2pPr marL="457200" indent="0" algn="ctr" defTabSz="914400" rtl="0" eaLnBrk="1" latinLnBrk="0" hangingPunct="1">
+              <a:lnSpc>
+                <a:spcPct val="90000"/>
+              </a:lnSpc>
+              <a:spcBef>
+                <a:spcPts val="500"/>
+              </a:spcBef>
+              <a:buFont typeface="Arial" panose="020B0604020202020204" pitchFamily="34" charset="0"/>
+              <a:buNone/>
+              <a:defRPr sz="2000" kern="1200">
+                <a:solidFill>
+                  <a:schemeClr val="tx1"/>
+                </a:solidFill>
+                <a:latin typeface="+mn-lt"/>
+                <a:ea typeface="+mn-ea"/>
+                <a:cs typeface="+mn-cs"/>
+              </a:defRPr>
+            </a:lvl2pPr>
+            <a:lvl3pPr marL="914400" indent="0" algn="ctr" defTabSz="914400" rtl="0" eaLnBrk="1" latinLnBrk="0" hangingPunct="1">
+              <a:lnSpc>
+                <a:spcPct val="90000"/>
+              </a:lnSpc>
+              <a:spcBef>
+                <a:spcPts val="500"/>
+              </a:spcBef>
+              <a:buFont typeface="Arial" panose="020B0604020202020204" pitchFamily="34" charset="0"/>
+              <a:buNone/>
+              <a:defRPr sz="1800" kern="1200">
+                <a:solidFill>
+                  <a:schemeClr val="tx1"/>
+                </a:solidFill>
+                <a:latin typeface="+mn-lt"/>
+                <a:ea typeface="+mn-ea"/>
+                <a:cs typeface="+mn-cs"/>
+              </a:defRPr>
+            </a:lvl3pPr>
+            <a:lvl4pPr marL="1371600" indent="0" algn="ctr" defTabSz="914400" rtl="0" eaLnBrk="1" latinLnBrk="0" hangingPunct="1">
+              <a:lnSpc>
+                <a:spcPct val="90000"/>
+              </a:lnSpc>
+              <a:spcBef>
+                <a:spcPts val="500"/>
+              </a:spcBef>
+              <a:buFont typeface="Arial" panose="020B0604020202020204" pitchFamily="34" charset="0"/>
+              <a:buNone/>
+              <a:defRPr sz="1600" kern="1200">
+                <a:solidFill>
+                  <a:schemeClr val="tx1"/>
+                </a:solidFill>
+                <a:latin typeface="+mn-lt"/>
+                <a:ea typeface="+mn-ea"/>
+                <a:cs typeface="+mn-cs"/>
+              </a:defRPr>
+            </a:lvl4pPr>
+            <a:lvl5pPr marL="1828800" indent="0" algn="ctr" defTabSz="914400" rtl="0" eaLnBrk="1" latinLnBrk="0" hangingPunct="1">
+              <a:lnSpc>
+                <a:spcPct val="90000"/>
+              </a:lnSpc>
+              <a:spcBef>
+                <a:spcPts val="500"/>
+              </a:spcBef>
+              <a:buFont typeface="Arial" panose="020B0604020202020204" pitchFamily="34" charset="0"/>
+              <a:buNone/>
+              <a:defRPr sz="1600" kern="1200">
+                <a:solidFill>
+                  <a:schemeClr val="tx1"/>
+                </a:solidFill>
+                <a:latin typeface="+mn-lt"/>
+                <a:ea typeface="+mn-ea"/>
+                <a:cs typeface="+mn-cs"/>
+              </a:defRPr>
+            </a:lvl5pPr>
+            <a:lvl6pPr marL="2286000" indent="0" algn="ctr" defTabSz="914400" rtl="0" eaLnBrk="1" latinLnBrk="0" hangingPunct="1">
+              <a:lnSpc>
+                <a:spcPct val="90000"/>
+              </a:lnSpc>
+              <a:spcBef>
+                <a:spcPts val="500"/>
+              </a:spcBef>
+              <a:buFont typeface="Arial" panose="020B0604020202020204" pitchFamily="34" charset="0"/>
+              <a:buNone/>
+              <a:defRPr sz="1600" kern="1200">
+                <a:solidFill>
+                  <a:schemeClr val="tx1"/>
+                </a:solidFill>
+                <a:latin typeface="+mn-lt"/>
+                <a:ea typeface="+mn-ea"/>
+                <a:cs typeface="+mn-cs"/>
+              </a:defRPr>
+            </a:lvl6pPr>
+            <a:lvl7pPr marL="2743200" indent="0" algn="ctr" defTabSz="914400" rtl="0" eaLnBrk="1" latinLnBrk="0" hangingPunct="1">
+              <a:lnSpc>
+                <a:spcPct val="90000"/>
+              </a:lnSpc>
+              <a:spcBef>
+                <a:spcPts val="500"/>
+              </a:spcBef>
+              <a:buFont typeface="Arial" panose="020B0604020202020204" pitchFamily="34" charset="0"/>
+              <a:buNone/>
+              <a:defRPr sz="1600" kern="1200">
+                <a:solidFill>
+                  <a:schemeClr val="tx1"/>
+                </a:solidFill>
+                <a:latin typeface="+mn-lt"/>
+                <a:ea typeface="+mn-ea"/>
+                <a:cs typeface="+mn-cs"/>
+              </a:defRPr>
+            </a:lvl7pPr>
+            <a:lvl8pPr marL="3200400" indent="0" algn="ctr" defTabSz="914400" rtl="0" eaLnBrk="1" latinLnBrk="0" hangingPunct="1">
+              <a:lnSpc>
+                <a:spcPct val="90000"/>
+              </a:lnSpc>
+              <a:spcBef>
+                <a:spcPts val="500"/>
+              </a:spcBef>
+              <a:buFont typeface="Arial" panose="020B0604020202020204" pitchFamily="34" charset="0"/>
+              <a:buNone/>
+              <a:defRPr sz="1600" kern="1200">
+                <a:solidFill>
+                  <a:schemeClr val="tx1"/>
+                </a:solidFill>
+                <a:latin typeface="+mn-lt"/>
+                <a:ea typeface="+mn-ea"/>
+                <a:cs typeface="+mn-cs"/>
+              </a:defRPr>
+            </a:lvl8pPr>
+            <a:lvl9pPr marL="3657600" indent="0" algn="ctr" defTabSz="914400" rtl="0" eaLnBrk="1" latinLnBrk="0" hangingPunct="1">
+              <a:lnSpc>
+                <a:spcPct val="90000"/>
+              </a:lnSpc>
+              <a:spcBef>
+                <a:spcPts val="500"/>
+              </a:spcBef>
+              <a:buFont typeface="Arial" panose="020B0604020202020204" pitchFamily="34" charset="0"/>
+              <a:buNone/>
+              <a:defRPr sz="1600" kern="1200">
+                <a:solidFill>
+                  <a:schemeClr val="tx1"/>
+                </a:solidFill>
+                <a:latin typeface="+mn-lt"/>
+                <a:ea typeface="+mn-ea"/>
+                <a:cs typeface="+mn-cs"/>
+              </a:defRPr>
+            </a:lvl9pPr>
+          </a:lstStyle>
+          <a:p>
+            <a:pPr algn="l"/>
+            <a:r>
+              <a:rPr lang="en-US" sz="2000" b="1" dirty="0">
+                <a:effectLst/>
+                <a:latin typeface="Arial" panose="020B0604020202020204" pitchFamily="34" charset="0"/>
+                <a:cs typeface="Arial" panose="020B0604020202020204" pitchFamily="34" charset="0"/>
+              </a:rPr>
+              <a:t>1.1 Inverse Reinforcement Learning</a:t>
+            </a:r>
+          </a:p>
+          <a:p>
+            <a:pPr algn="l"/>
+            <a:endParaRPr lang="en-US" sz="2000" b="1" dirty="0">
+              <a:effectLst/>
+              <a:latin typeface="Arial" panose="020B0604020202020204" pitchFamily="34" charset="0"/>
+              <a:cs typeface="Arial" panose="020B0604020202020204" pitchFamily="34" charset="0"/>
+            </a:endParaRPr>
+          </a:p>
+          <a:p>
+            <a:pPr algn="l"/>
+            <a:endParaRPr lang="en-US" sz="1800" b="0" i="0" dirty="0">
+              <a:effectLst/>
+              <a:latin typeface="Arial" panose="020B0604020202020204" pitchFamily="34" charset="0"/>
+              <a:cs typeface="Arial" panose="020B0604020202020204" pitchFamily="34" charset="0"/>
+            </a:endParaRPr>
+          </a:p>
+          <a:p>
+            <a:pPr algn="l"/>
+            <a:endParaRPr lang="en-US" sz="1800" dirty="0">
+              <a:latin typeface="Arial" panose="020B0604020202020204" pitchFamily="34" charset="0"/>
+              <a:cs typeface="Arial" panose="020B0604020202020204" pitchFamily="34" charset="0"/>
+            </a:endParaRPr>
+          </a:p>
+        </p:txBody>
+      </p:sp>
+      <p:sp>
+        <p:nvSpPr>
+          <p:cNvPr id="5" name="Slide Number Placeholder 4">
+            <a:extLst>
+              <a:ext uri="{FF2B5EF4-FFF2-40B4-BE49-F238E27FC236}">
+                <a16:creationId xmlns:a16="http://schemas.microsoft.com/office/drawing/2014/main" id="{5B1F76B4-FA7D-A14B-8F29-A06AEE9D6762}"/>
+              </a:ext>
+            </a:extLst>
+          </p:cNvPr>
+          <p:cNvSpPr>
+            <a:spLocks noGrp="1"/>
+          </p:cNvSpPr>
+          <p:nvPr>
+            <p:ph type="sldNum" sz="quarter" idx="12"/>
+          </p:nvPr>
+        </p:nvSpPr>
+        <p:spPr/>
+        <p:txBody>
+          <a:bodyPr/>
+          <a:lstStyle/>
+          <a:p>
+            <a:fld id="{837B6784-DA4F-4E23-8F4C-41806829DD81}" type="slidenum">
+              <a:rPr lang="en-US" smtClean="0">
+                <a:solidFill>
+                  <a:schemeClr val="bg1"/>
+                </a:solidFill>
+              </a:rPr>
+              <a:t>18</a:t>
+            </a:fld>
+            <a:endParaRPr lang="en-US" dirty="0">
+              <a:solidFill>
+                <a:schemeClr val="bg1"/>
+              </a:solidFill>
+            </a:endParaRPr>
+          </a:p>
+        </p:txBody>
+      </p:sp>
+      <p:sp>
+        <p:nvSpPr>
+          <p:cNvPr id="8" name="TextBox 7">
+            <a:extLst>
+              <a:ext uri="{FF2B5EF4-FFF2-40B4-BE49-F238E27FC236}">
+                <a16:creationId xmlns:a16="http://schemas.microsoft.com/office/drawing/2014/main" id="{A83CE2DA-49E0-9645-A265-C43E656A5B1F}"/>
+              </a:ext>
+            </a:extLst>
+          </p:cNvPr>
+          <p:cNvSpPr txBox="1"/>
+          <p:nvPr/>
+        </p:nvSpPr>
+        <p:spPr>
+          <a:xfrm>
+            <a:off x="1265873" y="1678907"/>
+            <a:ext cx="9666077" cy="646331"/>
+          </a:xfrm>
+          <a:prstGeom prst="rect">
+            <a:avLst/>
+          </a:prstGeom>
+          <a:noFill/>
+        </p:spPr>
+        <p:txBody>
+          <a:bodyPr wrap="square">
+            <a:spAutoFit/>
+          </a:bodyPr>
+          <a:lstStyle/>
+          <a:p>
+            <a:pPr marL="285750" indent="-285750" algn="just">
+              <a:buFont typeface="Wingdings" pitchFamily="2" charset="2"/>
+              <a:buChar char="Ø"/>
+            </a:pPr>
+            <a:r>
+              <a:rPr lang="en-US" sz="1800" dirty="0">
+                <a:latin typeface="Arial" panose="020B0604020202020204" pitchFamily="34" charset="0"/>
+                <a:cs typeface="Arial" panose="020B0604020202020204" pitchFamily="34" charset="0"/>
+              </a:rPr>
+              <a:t>The idea behind the Inverse Q-learning is to learn the reward function and use Q-learning to find the optimal policy</a:t>
+            </a:r>
+          </a:p>
+        </p:txBody>
+      </p:sp>
+    </p:spTree>
+    <p:extLst>
+      <p:ext uri="{BB962C8B-B14F-4D97-AF65-F5344CB8AC3E}">
+        <p14:creationId xmlns:p14="http://schemas.microsoft.com/office/powerpoint/2010/main" val="3465742753"/>
+      </p:ext>
+    </p:extLst>
+  </p:cSld>
+  <p:clrMapOvr>
+    <a:masterClrMapping/>
+  </p:clrMapOvr>
+</p:sld>
+</file>
+
+<file path=ppt/slides/slide19.xml><?xml version="1.0" encoding="utf-8"?>
+<p:sld xmlns:a="http://schemas.openxmlformats.org/drawingml/2006/main" xmlns:r="http://schemas.openxmlformats.org/officeDocument/2006/relationships" xmlns:p="http://schemas.openxmlformats.org/presentationml/2006/main">
+  <p:cSld>
+    <p:spTree>
+      <p:nvGrpSpPr>
+        <p:cNvPr id="1" name=""/>
+        <p:cNvGrpSpPr/>
+        <p:nvPr/>
+      </p:nvGrpSpPr>
+      <p:grpSpPr>
+        <a:xfrm>
+          <a:off x="0" y="0"/>
+          <a:ext cx="0" cy="0"/>
+          <a:chOff x="0" y="0"/>
+          <a:chExt cx="0" cy="0"/>
+        </a:xfrm>
+      </p:grpSpPr>
+      <p:sp>
+        <p:nvSpPr>
+          <p:cNvPr id="4" name="Subtitle 3">
+            <a:extLst>
+              <a:ext uri="{FF2B5EF4-FFF2-40B4-BE49-F238E27FC236}">
+                <a16:creationId xmlns:a16="http://schemas.microsoft.com/office/drawing/2014/main" id="{D1AD1E5D-99B8-3C4A-897A-4BAC4C0F8971}"/>
+              </a:ext>
+            </a:extLst>
+          </p:cNvPr>
+          <p:cNvSpPr>
+            <a:spLocks noGrp="1"/>
+          </p:cNvSpPr>
+          <p:nvPr>
+            <p:ph type="subTitle" idx="1"/>
+          </p:nvPr>
+        </p:nvSpPr>
+        <p:spPr>
+          <a:xfrm>
+            <a:off x="4124927" y="3102489"/>
+            <a:ext cx="3942145" cy="1071159"/>
+          </a:xfrm>
+        </p:spPr>
+        <p:txBody>
+          <a:bodyPr>
+            <a:noAutofit/>
+          </a:bodyPr>
+          <a:lstStyle/>
+          <a:p>
+            <a:r>
+              <a:rPr lang="en-US" sz="4400" dirty="0"/>
+              <a:t>Thank you..!</a:t>
+            </a:r>
+          </a:p>
+        </p:txBody>
+      </p:sp>
+      <p:sp>
+        <p:nvSpPr>
+          <p:cNvPr id="5" name="Slide Number Placeholder 4">
+            <a:extLst>
+              <a:ext uri="{FF2B5EF4-FFF2-40B4-BE49-F238E27FC236}">
+                <a16:creationId xmlns:a16="http://schemas.microsoft.com/office/drawing/2014/main" id="{39EA7063-7326-7441-A7A1-156D9ECDC9D6}"/>
+              </a:ext>
+            </a:extLst>
+          </p:cNvPr>
+          <p:cNvSpPr>
+            <a:spLocks noGrp="1"/>
+          </p:cNvSpPr>
+          <p:nvPr>
+            <p:ph type="sldNum" sz="quarter" idx="12"/>
+          </p:nvPr>
+        </p:nvSpPr>
+        <p:spPr/>
+        <p:txBody>
+          <a:bodyPr/>
+          <a:lstStyle/>
+          <a:p>
+            <a:fld id="{837B6784-DA4F-4E23-8F4C-41806829DD81}" type="slidenum">
+              <a:rPr lang="en-US" smtClean="0">
+                <a:solidFill>
+                  <a:schemeClr val="bg1"/>
+                </a:solidFill>
+              </a:rPr>
+              <a:t>19</a:t>
+            </a:fld>
+            <a:endParaRPr lang="en-US" dirty="0">
+              <a:solidFill>
+                <a:schemeClr val="bg1"/>
+              </a:solidFill>
+            </a:endParaRPr>
+          </a:p>
+        </p:txBody>
+      </p:sp>
+    </p:spTree>
+    <p:extLst>
+      <p:ext uri="{BB962C8B-B14F-4D97-AF65-F5344CB8AC3E}">
+        <p14:creationId xmlns:p14="http://schemas.microsoft.com/office/powerpoint/2010/main" val="318914768"/>
       </p:ext>
     </p:extLst>
   </p:cSld>
@@ -18209,8 +18737,8 @@
           </a:p>
         </p:txBody>
       </p:sp>
-      <mc:AlternateContent xmlns:mc="http://schemas.openxmlformats.org/markup-compatibility/2006">
-        <mc:Choice xmlns:a14="http://schemas.microsoft.com/office/drawing/2010/main" Requires="a14">
+      <mc:AlternateContent xmlns:mc="http://schemas.openxmlformats.org/markup-compatibility/2006" xmlns:a14="http://schemas.microsoft.com/office/drawing/2010/main">
+        <mc:Choice Requires="a14">
           <p:sp>
             <p:nvSpPr>
               <p:cNvPr id="19" name="TextBox 18">
@@ -18239,7 +18767,6 @@
               </a:bodyPr>
               <a:lstStyle/>
               <a:p>
-                <a:pPr/>
                 <a:r>
                   <a:rPr lang="en-US" sz="1600" b="1" i="1" dirty="0">
                     <a:latin typeface="Cambria Math" panose="02040503050406030204" pitchFamily="18" charset="0"/>
@@ -18248,13 +18775,11 @@
                 </a:r>
               </a:p>
               <a:p>
-                <a:pPr/>
                 <a:endParaRPr lang="en-US" sz="1600" b="1" i="1" dirty="0">
                   <a:latin typeface="Cambria Math" panose="02040503050406030204" pitchFamily="18" charset="0"/>
                 </a:endParaRPr>
               </a:p>
               <a:p>
-                <a:pPr/>
                 <a14:m>
                   <m:oMath xmlns:m="http://schemas.openxmlformats.org/officeDocument/2006/math">
                     <m:sSup>
@@ -18644,7 +19169,7 @@
             </p:txBody>
           </p:sp>
         </mc:Choice>
-        <mc:Fallback>
+        <mc:Fallback xmlns="">
           <p:sp>
             <p:nvSpPr>
               <p:cNvPr id="19" name="TextBox 18">

</xml_diff>